<commit_message>
Zanjirning bir qismi uchun Om qonuni
</commit_message>
<xml_diff>
--- a/Nazorat materiallari tuzuvchi.pptx
+++ b/Nazorat materiallari tuzuvchi.pptx
@@ -5,10 +5,10 @@
     <p:sldMasterId id="2147483650" r:id="rId4"/>
   </p:sldMasterIdLst>
   <p:notesMasterIdLst>
-    <p:notesMasterId r:id="rId14"/>
+    <p:notesMasterId r:id="rId16"/>
   </p:notesMasterIdLst>
   <p:handoutMasterIdLst>
-    <p:handoutMasterId r:id="rId15"/>
+    <p:handoutMasterId r:id="rId17"/>
   </p:handoutMasterIdLst>
   <p:sldIdLst>
     <p:sldId id="312" r:id="rId5"/>
@@ -19,7 +19,9 @@
     <p:sldId id="314" r:id="rId10"/>
     <p:sldId id="322" r:id="rId11"/>
     <p:sldId id="324" r:id="rId12"/>
-    <p:sldId id="297" r:id="rId13"/>
+    <p:sldId id="325" r:id="rId13"/>
+    <p:sldId id="326" r:id="rId14"/>
+    <p:sldId id="297" r:id="rId15"/>
   </p:sldIdLst>
   <p:sldSz cx="12192000" cy="6858000"/>
   <p:notesSz cx="13716000" cy="24384000"/>
@@ -17867,6 +17869,321 @@
   <p:clrMapOvr>
     <a:masterClrMapping/>
   </p:clrMapOvr>
+  <mc:AlternateContent xmlns:mc="http://schemas.openxmlformats.org/markup-compatibility/2006" xmlns:p14="http://schemas.microsoft.com/office/powerpoint/2010/main">
+    <mc:Choice Requires="p14">
+      <p:transition spd="slow" p14:dur="1200">
+        <p14:prism/>
+      </p:transition>
+    </mc:Choice>
+    <mc:Fallback xmlns="">
+      <p:transition spd="slow">
+        <p:fade/>
+      </p:transition>
+    </mc:Fallback>
+  </mc:AlternateContent>
+</p:sld>
+</file>
+
+<file path=ppt/slides/slide10.xml><?xml version="1.0" encoding="utf-8"?>
+<p:sld xmlns:a="http://schemas.openxmlformats.org/drawingml/2006/main" xmlns:r="http://schemas.openxmlformats.org/officeDocument/2006/relationships" xmlns:p="http://schemas.openxmlformats.org/presentationml/2006/main">
+  <p:cSld>
+    <p:spTree>
+      <p:nvGrpSpPr>
+        <p:cNvPr id="1" name=""/>
+        <p:cNvGrpSpPr/>
+        <p:nvPr/>
+      </p:nvGrpSpPr>
+      <p:grpSpPr>
+        <a:xfrm>
+          <a:off x="0" y="0"/>
+          <a:ext cx="0" cy="0"/>
+          <a:chOff x="0" y="0"/>
+          <a:chExt cx="0" cy="0"/>
+        </a:xfrm>
+      </p:grpSpPr>
+      <p:sp>
+        <p:nvSpPr>
+          <p:cNvPr id="4" name="Номер слайда 3">
+            <a:extLst>
+              <a:ext uri="{FF2B5EF4-FFF2-40B4-BE49-F238E27FC236}">
+                <a16:creationId xmlns:a16="http://schemas.microsoft.com/office/drawing/2014/main" id="{51EEBFB1-7CFF-46CD-BBEE-CD5E56735275}"/>
+              </a:ext>
+            </a:extLst>
+          </p:cNvPr>
+          <p:cNvSpPr>
+            <a:spLocks noGrp="1"/>
+          </p:cNvSpPr>
+          <p:nvPr>
+            <p:ph type="sldNum" sz="quarter" idx="10"/>
+          </p:nvPr>
+        </p:nvSpPr>
+        <p:spPr/>
+        <p:txBody>
+          <a:bodyPr/>
+          <a:lstStyle/>
+          <a:p>
+            <a:pPr rtl="0"/>
+            <a:fld id="{48F63A3B-78C7-47BE-AE5E-E10140E04643}" type="slidenum">
+              <a:rPr lang="ru-RU" smtClean="0"/>
+              <a:pPr rtl="0"/>
+              <a:t>10</a:t>
+            </a:fld>
+            <a:endParaRPr lang="ru-RU" dirty="0"/>
+          </a:p>
+        </p:txBody>
+      </p:sp>
+      <p:pic>
+        <p:nvPicPr>
+          <p:cNvPr id="6" name="Рисунок 5">
+            <a:extLst>
+              <a:ext uri="{FF2B5EF4-FFF2-40B4-BE49-F238E27FC236}">
+                <a16:creationId xmlns:a16="http://schemas.microsoft.com/office/drawing/2014/main" id="{F6C7CA64-99AF-48DE-B48C-B9AD22AF5149}"/>
+              </a:ext>
+            </a:extLst>
+          </p:cNvPr>
+          <p:cNvPicPr>
+            <a:picLocks noChangeAspect="1"/>
+          </p:cNvPicPr>
+          <p:nvPr/>
+        </p:nvPicPr>
+        <p:blipFill rotWithShape="1">
+          <a:blip r:embed="rId2"/>
+          <a:srcRect r="33152"/>
+          <a:stretch/>
+        </p:blipFill>
+        <p:spPr>
+          <a:xfrm>
+            <a:off x="-1" y="928688"/>
+            <a:ext cx="11144561" cy="5929312"/>
+          </a:xfrm>
+          <a:prstGeom prst="rect">
+            <a:avLst/>
+          </a:prstGeom>
+        </p:spPr>
+      </p:pic>
+      <p:sp>
+        <p:nvSpPr>
+          <p:cNvPr id="7" name="Заголовок 1">
+            <a:extLst>
+              <a:ext uri="{FF2B5EF4-FFF2-40B4-BE49-F238E27FC236}">
+                <a16:creationId xmlns:a16="http://schemas.microsoft.com/office/drawing/2014/main" id="{8BD4E7AC-547D-486C-BBF8-5D1A6AC53A71}"/>
+              </a:ext>
+            </a:extLst>
+          </p:cNvPr>
+          <p:cNvSpPr>
+            <a:spLocks noGrp="1"/>
+          </p:cNvSpPr>
+          <p:nvPr>
+            <p:ph type="title"/>
+          </p:nvPr>
+        </p:nvSpPr>
+        <p:spPr>
+          <a:xfrm>
+            <a:off x="2345117" y="142459"/>
+            <a:ext cx="8799443" cy="629479"/>
+          </a:xfrm>
+        </p:spPr>
+        <p:txBody>
+          <a:bodyPr/>
+          <a:lstStyle/>
+          <a:p>
+            <a:pPr algn="ctr"/>
+            <a:r>
+              <a:rPr lang="uz-Latn-UZ" dirty="0"/>
+              <a:t>Dasturning ishchi namunasi</a:t>
+            </a:r>
+          </a:p>
+        </p:txBody>
+      </p:sp>
+    </p:spTree>
+    <p:extLst>
+      <p:ext uri="{BB962C8B-B14F-4D97-AF65-F5344CB8AC3E}">
+        <p14:creationId xmlns:p14="http://schemas.microsoft.com/office/powerpoint/2010/main" val="694021566"/>
+      </p:ext>
+    </p:extLst>
+  </p:cSld>
+  <p:clrMapOvr>
+    <a:masterClrMapping/>
+  </p:clrMapOvr>
+</p:sld>
+</file>
+
+<file path=ppt/slides/slide11.xml><?xml version="1.0" encoding="utf-8"?>
+<p:sld xmlns:a="http://schemas.openxmlformats.org/drawingml/2006/main" xmlns:r="http://schemas.openxmlformats.org/officeDocument/2006/relationships" xmlns:p="http://schemas.openxmlformats.org/presentationml/2006/main">
+  <p:cSld>
+    <p:spTree>
+      <p:nvGrpSpPr>
+        <p:cNvPr id="1" name=""/>
+        <p:cNvGrpSpPr/>
+        <p:nvPr/>
+      </p:nvGrpSpPr>
+      <p:grpSpPr>
+        <a:xfrm>
+          <a:off x="0" y="0"/>
+          <a:ext cx="0" cy="0"/>
+          <a:chOff x="0" y="0"/>
+          <a:chExt cx="0" cy="0"/>
+        </a:xfrm>
+      </p:grpSpPr>
+      <p:sp>
+        <p:nvSpPr>
+          <p:cNvPr id="2" name="Заголовок 1">
+            <a:extLst>
+              <a:ext uri="{FF2B5EF4-FFF2-40B4-BE49-F238E27FC236}">
+                <a16:creationId xmlns:a16="http://schemas.microsoft.com/office/drawing/2014/main" id="{509D22C5-0C9E-B582-A8FE-B45E70A01E7F}"/>
+              </a:ext>
+            </a:extLst>
+          </p:cNvPr>
+          <p:cNvSpPr>
+            <a:spLocks noGrp="1"/>
+          </p:cNvSpPr>
+          <p:nvPr>
+            <p:ph type="ctrTitle"/>
+          </p:nvPr>
+        </p:nvSpPr>
+        <p:spPr>
+          <a:xfrm>
+            <a:off x="914401" y="849782"/>
+            <a:ext cx="5715000" cy="1509105"/>
+          </a:xfrm>
+        </p:spPr>
+        <p:txBody>
+          <a:bodyPr rtlCol="0"/>
+          <a:lstStyle>
+            <a:defPPr>
+              <a:defRPr lang="ru-RU"/>
+            </a:defPPr>
+          </a:lstStyle>
+          <a:p>
+            <a:pPr algn="ctr" rtl="0"/>
+            <a:r>
+              <a:rPr lang="uz-Latn-UZ" dirty="0"/>
+              <a:t>E’tiboringiz uchun rahmat !</a:t>
+            </a:r>
+            <a:endParaRPr lang="ru-RU" dirty="0"/>
+          </a:p>
+        </p:txBody>
+      </p:sp>
+      <p:sp>
+        <p:nvSpPr>
+          <p:cNvPr id="3" name="Подзаголовок 2">
+            <a:extLst>
+              <a:ext uri="{FF2B5EF4-FFF2-40B4-BE49-F238E27FC236}">
+                <a16:creationId xmlns:a16="http://schemas.microsoft.com/office/drawing/2014/main" id="{D8B5CEF2-E667-BBB5-2EA6-C06F93B6DE12}"/>
+              </a:ext>
+            </a:extLst>
+          </p:cNvPr>
+          <p:cNvSpPr>
+            <a:spLocks noGrp="1"/>
+          </p:cNvSpPr>
+          <p:nvPr>
+            <p:ph type="subTitle" idx="1"/>
+          </p:nvPr>
+        </p:nvSpPr>
+        <p:spPr>
+          <a:xfrm>
+            <a:off x="914401" y="3813606"/>
+            <a:ext cx="5715000" cy="2234642"/>
+          </a:xfrm>
+        </p:spPr>
+        <p:txBody>
+          <a:bodyPr rtlCol="0"/>
+          <a:lstStyle>
+            <a:defPPr>
+              <a:defRPr lang="ru-RU"/>
+            </a:defPPr>
+          </a:lstStyle>
+          <a:p>
+            <a:pPr rtl="0"/>
+            <a:r>
+              <a:rPr lang="uz-Latn-UZ" dirty="0"/>
+              <a:t>Qarshiboyeva Bonu </a:t>
+            </a:r>
+            <a:endParaRPr lang="ru-RU" dirty="0"/>
+          </a:p>
+          <a:p>
+            <a:r>
+              <a:rPr lang="uz-Latn-UZ" dirty="0"/>
+              <a:t>     @QB2309</a:t>
+            </a:r>
+          </a:p>
+          <a:p>
+            <a:r>
+              <a:rPr lang="uz-Latn-UZ" dirty="0"/>
+              <a:t>📧 qarshiboyevkamron218@gmail.com</a:t>
+            </a:r>
+          </a:p>
+        </p:txBody>
+      </p:sp>
+      <p:pic>
+        <p:nvPicPr>
+          <p:cNvPr id="1026" name="Picture 2">
+            <a:extLst>
+              <a:ext uri="{FF2B5EF4-FFF2-40B4-BE49-F238E27FC236}">
+                <a16:creationId xmlns:a16="http://schemas.microsoft.com/office/drawing/2014/main" id="{9BAEFB54-BD00-4CB0-88FF-0E227D379DBD}"/>
+              </a:ext>
+            </a:extLst>
+          </p:cNvPr>
+          <p:cNvPicPr>
+            <a:picLocks noChangeAspect="1" noChangeArrowheads="1"/>
+          </p:cNvPicPr>
+          <p:nvPr/>
+        </p:nvPicPr>
+        <p:blipFill>
+          <a:blip r:embed="rId3">
+            <a:extLst>
+              <a:ext uri="{28A0092B-C50C-407E-A947-70E740481C1C}">
+                <a14:useLocalDpi xmlns:a14="http://schemas.microsoft.com/office/drawing/2010/main" val="0"/>
+              </a:ext>
+            </a:extLst>
+          </a:blip>
+          <a:srcRect/>
+          <a:stretch>
+            <a:fillRect/>
+          </a:stretch>
+        </p:blipFill>
+        <p:spPr bwMode="auto">
+          <a:xfrm>
+            <a:off x="1050235" y="4320207"/>
+            <a:ext cx="265045" cy="265045"/>
+          </a:xfrm>
+          <a:prstGeom prst="rect">
+            <a:avLst/>
+          </a:prstGeom>
+          <a:noFill/>
+          <a:extLst>
+            <a:ext uri="{909E8E84-426E-40DD-AFC4-6F175D3DCCD1}">
+              <a14:hiddenFill xmlns:a14="http://schemas.microsoft.com/office/drawing/2010/main">
+                <a:solidFill>
+                  <a:srgbClr val="FFFFFF"/>
+                </a:solidFill>
+              </a14:hiddenFill>
+            </a:ext>
+          </a:extLst>
+        </p:spPr>
+      </p:pic>
+    </p:spTree>
+    <p:extLst>
+      <p:ext uri="{BB962C8B-B14F-4D97-AF65-F5344CB8AC3E}">
+        <p14:creationId xmlns:p14="http://schemas.microsoft.com/office/powerpoint/2010/main" val="1973173046"/>
+      </p:ext>
+    </p:extLst>
+  </p:cSld>
+  <p:clrMapOvr>
+    <a:masterClrMapping/>
+  </p:clrMapOvr>
+  <mc:AlternateContent xmlns:mc="http://schemas.openxmlformats.org/markup-compatibility/2006" xmlns:p14="http://schemas.microsoft.com/office/powerpoint/2010/main">
+    <mc:Choice Requires="p14">
+      <p:transition spd="slow" p14:dur="1200">
+        <p14:prism/>
+      </p:transition>
+    </mc:Choice>
+    <mc:Fallback xmlns="">
+      <p:transition spd="slow">
+        <p:fade/>
+      </p:transition>
+    </mc:Fallback>
+  </mc:AlternateContent>
 </p:sld>
 </file>
 
@@ -18041,6 +18358,18 @@
   <p:clrMapOvr>
     <a:masterClrMapping/>
   </p:clrMapOvr>
+  <mc:AlternateContent xmlns:mc="http://schemas.openxmlformats.org/markup-compatibility/2006" xmlns:p14="http://schemas.microsoft.com/office/powerpoint/2010/main">
+    <mc:Choice Requires="p14">
+      <p:transition spd="slow" p14:dur="1200">
+        <p14:prism/>
+      </p:transition>
+    </mc:Choice>
+    <mc:Fallback xmlns="">
+      <p:transition spd="slow">
+        <p:fade/>
+      </p:transition>
+    </mc:Fallback>
+  </mc:AlternateContent>
 </p:sld>
 </file>
 
@@ -18156,6 +18485,18 @@
   <p:clrMapOvr>
     <a:masterClrMapping/>
   </p:clrMapOvr>
+  <mc:AlternateContent xmlns:mc="http://schemas.openxmlformats.org/markup-compatibility/2006" xmlns:p14="http://schemas.microsoft.com/office/powerpoint/2010/main">
+    <mc:Choice Requires="p14">
+      <p:transition spd="slow" p14:dur="1200">
+        <p14:prism/>
+      </p:transition>
+    </mc:Choice>
+    <mc:Fallback xmlns="">
+      <p:transition spd="slow">
+        <p:fade/>
+      </p:transition>
+    </mc:Fallback>
+  </mc:AlternateContent>
 </p:sld>
 </file>
 
@@ -18195,7 +18536,7 @@
         <p:spPr>
           <a:xfrm>
             <a:off x="3460565" y="1057274"/>
-            <a:ext cx="7965461" cy="994164"/>
+            <a:ext cx="7965461" cy="1699178"/>
           </a:xfrm>
         </p:spPr>
         <p:txBody>
@@ -18209,7 +18550,7 @@
             <a:pPr algn="ctr" rtl="0"/>
             <a:r>
               <a:rPr lang="uz-Latn-UZ" dirty="0"/>
-              <a:t>Yangi sinov materiallari tuzishda </a:t>
+              <a:t>Yangi sinov materiallari tuzishdagi ko’p kuzatiladigan holatlar</a:t>
             </a:r>
             <a:endParaRPr lang="ru-RU" dirty="0"/>
           </a:p>
@@ -18233,8 +18574,8 @@
         </p:nvSpPr>
         <p:spPr>
           <a:xfrm>
-            <a:off x="3460565" y="2303029"/>
-            <a:ext cx="7965460" cy="3497698"/>
+            <a:off x="3460565" y="3428999"/>
+            <a:ext cx="7965460" cy="2371727"/>
           </a:xfrm>
         </p:spPr>
         <p:txBody>
@@ -18335,6 +18676,18 @@
   <p:clrMapOvr>
     <a:masterClrMapping/>
   </p:clrMapOvr>
+  <mc:AlternateContent xmlns:mc="http://schemas.openxmlformats.org/markup-compatibility/2006" xmlns:p14="http://schemas.microsoft.com/office/powerpoint/2010/main">
+    <mc:Choice Requires="p14">
+      <p:transition spd="slow" p14:dur="1200">
+        <p14:prism/>
+      </p:transition>
+    </mc:Choice>
+    <mc:Fallback xmlns="">
+      <p:transition spd="slow">
+        <p:fade/>
+      </p:transition>
+    </mc:Fallback>
+  </mc:AlternateContent>
 </p:sld>
 </file>
 
@@ -18462,7 +18815,7 @@
             </a:pPr>
             <a:r>
               <a:rPr lang="uz-Latn-UZ" dirty="0"/>
-              <a:t>O’quvchilarga taqdim etilayotgan vaziantlarning yagona bo’lishi. (O’quvchilar orasida ko’chirmakashlikni oldini olish)</a:t>
+              <a:t>O’quvchilarga taqdim etilayotgan variantlarning yagona bo’lishi. (O’quvchilar orasida ko’chirmakashlikni oldini olish)</a:t>
             </a:r>
           </a:p>
         </p:txBody>
@@ -18513,6 +18866,18 @@
   <p:clrMapOvr>
     <a:masterClrMapping/>
   </p:clrMapOvr>
+  <mc:AlternateContent xmlns:mc="http://schemas.openxmlformats.org/markup-compatibility/2006" xmlns:p14="http://schemas.microsoft.com/office/powerpoint/2010/main">
+    <mc:Choice Requires="p14">
+      <p:transition spd="slow" p14:dur="1200">
+        <p14:prism/>
+      </p:transition>
+    </mc:Choice>
+    <mc:Fallback xmlns="">
+      <p:transition spd="slow">
+        <p:fade/>
+      </p:transition>
+    </mc:Fallback>
+  </mc:AlternateContent>
 </p:sld>
 </file>
 
@@ -18666,6 +19031,18 @@
   <p:clrMapOvr>
     <a:masterClrMapping/>
   </p:clrMapOvr>
+  <mc:AlternateContent xmlns:mc="http://schemas.openxmlformats.org/markup-compatibility/2006" xmlns:p14="http://schemas.microsoft.com/office/powerpoint/2010/main">
+    <mc:Choice Requires="p14">
+      <p:transition spd="slow" p14:dur="1200">
+        <p14:prism/>
+      </p:transition>
+    </mc:Choice>
+    <mc:Fallback xmlns="">
+      <p:transition spd="slow">
+        <p:fade/>
+      </p:transition>
+    </mc:Fallback>
+  </mc:AlternateContent>
 </p:sld>
 </file>
 
@@ -18741,7 +19118,7 @@
             <p:ph sz="quarter" idx="4"/>
             <p:extLst>
               <p:ext uri="{D42A27DB-BD31-4B8C-83A1-F6EECF244321}">
-                <p14:modId xmlns:p14="http://schemas.microsoft.com/office/powerpoint/2010/main" val="4232684049"/>
+                <p14:modId xmlns:p14="http://schemas.microsoft.com/office/powerpoint/2010/main" val="3956026231"/>
               </p:ext>
             </p:extLst>
           </p:nvPr>
@@ -18992,7 +19369,7 @@
                       <a:pPr rtl="0"/>
                       <a:r>
                         <a:rPr lang="uz-Latn-UZ" noProof="0" dirty="0"/>
-                        <a:t>NMT dasturida matematika matematik faniga doir misollarni qo’shish</a:t>
+                        <a:t>NMT dasturida matematika faniga doir misollarni qo’shish</a:t>
                       </a:r>
                       <a:endParaRPr lang="ru-RU" noProof="0" dirty="0"/>
                     </a:p>
@@ -19225,6 +19602,18 @@
   <p:clrMapOvr>
     <a:masterClrMapping/>
   </p:clrMapOvr>
+  <mc:AlternateContent xmlns:mc="http://schemas.openxmlformats.org/markup-compatibility/2006" xmlns:p14="http://schemas.microsoft.com/office/powerpoint/2010/main">
+    <mc:Choice Requires="p14">
+      <p:transition spd="slow" p14:dur="1200">
+        <p14:prism/>
+      </p:transition>
+    </mc:Choice>
+    <mc:Fallback xmlns="">
+      <p:transition spd="slow">
+        <p:fade/>
+      </p:transition>
+    </mc:Fallback>
+  </mc:AlternateContent>
 </p:sld>
 </file>
 
@@ -19278,7 +19667,7 @@
             <a:pPr algn="ctr" rtl="0"/>
             <a:r>
               <a:rPr lang="uz-Latn-UZ" dirty="0"/>
-              <a:t>Loyihani amalga oshirish taxminiy haratjatlari</a:t>
+              <a:t>Loyihani amalga oshirish taxminiy harajatlari</a:t>
             </a:r>
             <a:endParaRPr lang="ru-RU" dirty="0"/>
           </a:p>
@@ -19332,6 +19721,13 @@
             <a:r>
               <a:rPr lang="uz-Latn-UZ" dirty="0"/>
               <a:t>Dasturni internet tarmog’iga qo’yishda qilinadigan harajatlar 200 ming/oy</a:t>
+            </a:r>
+          </a:p>
+          <a:p>
+            <a:pPr rtl="0"/>
+            <a:r>
+              <a:rPr lang="uz-Latn-UZ" i="1" dirty="0"/>
+              <a:t>Hozirgi kungacha 35000 so’m harajat qilingan.</a:t>
             </a:r>
           </a:p>
           <a:p>
@@ -19438,6 +19834,18 @@
   <p:clrMapOvr>
     <a:masterClrMapping/>
   </p:clrMapOvr>
+  <mc:AlternateContent xmlns:mc="http://schemas.openxmlformats.org/markup-compatibility/2006" xmlns:p14="http://schemas.microsoft.com/office/powerpoint/2010/main">
+    <mc:Choice Requires="p14">
+      <p:transition spd="slow" p14:dur="1200">
+        <p14:prism/>
+      </p:transition>
+    </mc:Choice>
+    <mc:Fallback xmlns="">
+      <p:transition spd="slow">
+        <p:fade/>
+      </p:transition>
+    </mc:Fallback>
+  </mc:AlternateContent>
 </p:sld>
 </file>
 
@@ -19463,7 +19871,7 @@
           <p:cNvPr id="2" name="Заголовок 1">
             <a:extLst>
               <a:ext uri="{FF2B5EF4-FFF2-40B4-BE49-F238E27FC236}">
-                <a16:creationId xmlns:a16="http://schemas.microsoft.com/office/drawing/2014/main" id="{509D22C5-0C9E-B582-A8FE-B45E70A01E7F}"/>
+                <a16:creationId xmlns:a16="http://schemas.microsoft.com/office/drawing/2014/main" id="{71DA706F-1284-4DE7-8CED-5C33383AC178}"/>
               </a:ext>
             </a:extLst>
           </p:cNvPr>
@@ -19471,38 +19879,33 @@
             <a:spLocks noGrp="1"/>
           </p:cNvSpPr>
           <p:nvPr>
-            <p:ph type="ctrTitle"/>
+            <p:ph type="title"/>
           </p:nvPr>
         </p:nvSpPr>
         <p:spPr>
           <a:xfrm>
-            <a:off x="914401" y="849782"/>
-            <a:ext cx="5715000" cy="1509105"/>
+            <a:off x="5141842" y="622852"/>
+            <a:ext cx="6284183" cy="1086678"/>
           </a:xfrm>
         </p:spPr>
         <p:txBody>
-          <a:bodyPr rtlCol="0"/>
-          <a:lstStyle>
-            <a:defPPr>
-              <a:defRPr lang="ru-RU"/>
-            </a:defPPr>
-          </a:lstStyle>
+          <a:bodyPr/>
+          <a:lstStyle/>
           <a:p>
-            <a:pPr algn="ctr" rtl="0"/>
+            <a:pPr algn="ctr"/>
             <a:r>
               <a:rPr lang="uz-Latn-UZ" dirty="0"/>
-              <a:t>E’tiboringiz uchun rahmat !</a:t>
+              <a:t>Kitob yozishning yangi bosqichi</a:t>
             </a:r>
-            <a:endParaRPr lang="ru-RU" dirty="0"/>
           </a:p>
         </p:txBody>
       </p:sp>
       <p:sp>
         <p:nvSpPr>
-          <p:cNvPr id="3" name="Подзаголовок 2">
+          <p:cNvPr id="3" name="Объект 2">
             <a:extLst>
               <a:ext uri="{FF2B5EF4-FFF2-40B4-BE49-F238E27FC236}">
-                <a16:creationId xmlns:a16="http://schemas.microsoft.com/office/drawing/2014/main" id="{D8B5CEF2-E667-BBB5-2EA6-C06F93B6DE12}"/>
+                <a16:creationId xmlns:a16="http://schemas.microsoft.com/office/drawing/2014/main" id="{9D48736D-5FA1-46E7-8FFE-E9839106A41A}"/>
               </a:ext>
             </a:extLst>
           </p:cNvPr>
@@ -19510,50 +19913,84 @@
             <a:spLocks noGrp="1"/>
           </p:cNvSpPr>
           <p:nvPr>
-            <p:ph type="subTitle" idx="1"/>
+            <p:ph sz="half" idx="2"/>
           </p:nvPr>
         </p:nvSpPr>
         <p:spPr>
           <a:xfrm>
-            <a:off x="914401" y="3813606"/>
-            <a:ext cx="5715000" cy="2234642"/>
+            <a:off x="4982817" y="2303029"/>
+            <a:ext cx="6443208" cy="3497698"/>
           </a:xfrm>
         </p:spPr>
         <p:txBody>
-          <a:bodyPr rtlCol="0"/>
-          <a:lstStyle>
-            <a:defPPr>
-              <a:defRPr lang="ru-RU"/>
-            </a:defPPr>
-          </a:lstStyle>
+          <a:bodyPr/>
+          <a:lstStyle/>
           <a:p>
-            <a:pPr rtl="0"/>
+            <a:pPr marL="0" indent="0">
+              <a:buNone/>
+            </a:pPr>
             <a:r>
               <a:rPr lang="uz-Latn-UZ" dirty="0"/>
-              <a:t>Qarshiboyeva Bonu </a:t>
-            </a:r>
-            <a:endParaRPr lang="ru-RU" dirty="0"/>
-          </a:p>
-          <a:p>
-            <a:r>
-              <a:rPr lang="uz-Latn-UZ" dirty="0"/>
-              <a:t>     @QB2309</a:t>
+              <a:t>Mansur Usmanovning Fizikadan savol va masalalar to’plami kitobi mavzulashtirilgan masalalardan tashkil topgan bo’lib, ushbu kitob 2018-yilda o’qituvchi tomonidan qo’lda yozilgan va bu uchun bir nechta oy vaqt ketadi. NMT-AI dasturi ishga tushgandan so’ng ushbu kitobga o’xshash kitoblarni yozish 1 kundan kamroq vaqt ketadi. Buning uchun masalalarni dasturimizdan ko’chirib olish va kitob shaklida taxlash kerak.</a:t>
             </a:r>
           </a:p>
           <a:p>
-            <a:r>
-              <a:rPr lang="uz-Latn-UZ" dirty="0"/>
-              <a:t>📧 qarshiboyevkamron218@gmail.com</a:t>
-            </a:r>
+            <a:pPr marL="0" indent="0">
+              <a:buNone/>
+            </a:pPr>
+            <a:endParaRPr lang="uz-Latn-UZ" dirty="0"/>
+          </a:p>
+          <a:p>
+            <a:pPr marL="0" indent="0">
+              <a:buNone/>
+            </a:pPr>
+            <a:endParaRPr lang="uz-Latn-UZ" dirty="0"/>
+          </a:p>
+          <a:p>
+            <a:pPr marL="0" indent="0">
+              <a:buNone/>
+            </a:pPr>
+            <a:endParaRPr lang="uz-Latn-UZ" dirty="0"/>
+          </a:p>
+        </p:txBody>
+      </p:sp>
+      <p:sp>
+        <p:nvSpPr>
+          <p:cNvPr id="4" name="Номер слайда 3">
+            <a:extLst>
+              <a:ext uri="{FF2B5EF4-FFF2-40B4-BE49-F238E27FC236}">
+                <a16:creationId xmlns:a16="http://schemas.microsoft.com/office/drawing/2014/main" id="{34D0F693-48F4-48B0-A57D-BEFC2F65FAFF}"/>
+              </a:ext>
+            </a:extLst>
+          </p:cNvPr>
+          <p:cNvSpPr>
+            <a:spLocks noGrp="1"/>
+          </p:cNvSpPr>
+          <p:nvPr>
+            <p:ph type="sldNum" sz="quarter" idx="10"/>
+          </p:nvPr>
+        </p:nvSpPr>
+        <p:spPr/>
+        <p:txBody>
+          <a:bodyPr/>
+          <a:lstStyle/>
+          <a:p>
+            <a:pPr rtl="0"/>
+            <a:fld id="{48F63A3B-78C7-47BE-AE5E-E10140E04643}" type="slidenum">
+              <a:rPr lang="ru-RU" smtClean="0"/>
+              <a:pPr rtl="0"/>
+              <a:t>9</a:t>
+            </a:fld>
+            <a:endParaRPr lang="ru-RU" dirty="0"/>
           </a:p>
         </p:txBody>
       </p:sp>
       <p:pic>
         <p:nvPicPr>
-          <p:cNvPr id="1026" name="Picture 2">
+          <p:cNvPr id="1026" name="Picture 2" descr="Fizikadan savol va masalalar to'plami (boshlang'ich bilim oluvchilar uchun)  (A5,yumshoq)">
             <a:extLst>
               <a:ext uri="{FF2B5EF4-FFF2-40B4-BE49-F238E27FC236}">
-                <a16:creationId xmlns:a16="http://schemas.microsoft.com/office/drawing/2014/main" id="{9BAEFB54-BD00-4CB0-88FF-0E227D379DBD}"/>
+                <a16:creationId xmlns:a16="http://schemas.microsoft.com/office/drawing/2014/main" id="{6310327F-A70A-40A2-A13A-B41B80F5E43C}"/>
               </a:ext>
             </a:extLst>
           </p:cNvPr>
@@ -19563,7 +20000,7 @@
           <p:nvPr/>
         </p:nvPicPr>
         <p:blipFill>
-          <a:blip r:embed="rId3">
+          <a:blip r:embed="rId2">
             <a:extLst>
               <a:ext uri="{28A0092B-C50C-407E-A947-70E740481C1C}">
                 <a14:useLocalDpi xmlns:a14="http://schemas.microsoft.com/office/drawing/2010/main" val="0"/>
@@ -19577,8 +20014,8 @@
         </p:blipFill>
         <p:spPr bwMode="auto">
           <a:xfrm>
-            <a:off x="1050235" y="4320207"/>
-            <a:ext cx="265045" cy="265045"/>
+            <a:off x="0" y="0"/>
+            <a:ext cx="4505739" cy="6845514"/>
           </a:xfrm>
           <a:prstGeom prst="rect">
             <a:avLst/>
@@ -19598,13 +20035,25 @@
     </p:spTree>
     <p:extLst>
       <p:ext uri="{BB962C8B-B14F-4D97-AF65-F5344CB8AC3E}">
-        <p14:creationId xmlns:p14="http://schemas.microsoft.com/office/powerpoint/2010/main" val="1973173046"/>
+        <p14:creationId xmlns:p14="http://schemas.microsoft.com/office/powerpoint/2010/main" val="2458427030"/>
       </p:ext>
     </p:extLst>
   </p:cSld>
   <p:clrMapOvr>
     <a:masterClrMapping/>
   </p:clrMapOvr>
+  <mc:AlternateContent xmlns:mc="http://schemas.openxmlformats.org/markup-compatibility/2006" xmlns:p14="http://schemas.microsoft.com/office/powerpoint/2010/main">
+    <mc:Choice Requires="p14">
+      <p:transition spd="slow" p14:dur="1200">
+        <p14:prism/>
+      </p:transition>
+    </mc:Choice>
+    <mc:Fallback xmlns="">
+      <p:transition spd="slow">
+        <p:fade/>
+      </p:transition>
+    </mc:Fallback>
+  </mc:AlternateContent>
 </p:sld>
 </file>
 

</xml_diff>